<commit_message>
Session 1 Slides and DIY Extension Completed
</commit_message>
<xml_diff>
--- a/SiS-P5P6-Teacher-Notes-How_to_Teach_Computers_to_Recognize_Things.pptx
+++ b/SiS-P5P6-Teacher-Notes-How_to_Teach_Computers_to_Recognize_Things.pptx
@@ -202,7 +202,7 @@
           <a:p>
             <a:fld id="{125EBC3A-94A2-4096-A01A-A7978FAA9403}" type="datetimeFigureOut">
               <a:rPr lang="en-US" smtClean="0"/>
-              <a:t>2/20/2024</a:t>
+              <a:t>6/26/2024</a:t>
             </a:fld>
             <a:endParaRPr lang="en-US"/>
           </a:p>
@@ -6961,7 +6961,7 @@
           <a:p>
             <a:r>
               <a:rPr lang="en-US" dirty="0"/>
-              <a:t>Jan 2023</a:t>
+              <a:t>June 2024</a:t>
             </a:r>
           </a:p>
         </p:txBody>
@@ -7049,7 +7049,7 @@
           <a:p>
             <a:r>
               <a:rPr lang="en-US" dirty="0"/>
-              <a:t>Cyber Physical Production System</a:t>
+              <a:t>Smart Virtual System</a:t>
             </a:r>
           </a:p>
         </p:txBody>

</xml_diff>